<commit_message>
outline script & pitchdeck
</commit_message>
<xml_diff>
--- a/Docs/Pitch Deck Robot Petani.pptx
+++ b/Docs/Pitch Deck Robot Petani.pptx
@@ -6,6 +6,14 @@
   </p:sldMasterIdLst>
   <p:sldIdLst>
     <p:sldId id="256" r:id="rId2"/>
+    <p:sldId id="257" r:id="rId3"/>
+    <p:sldId id="258" r:id="rId4"/>
+    <p:sldId id="259" r:id="rId5"/>
+    <p:sldId id="260" r:id="rId6"/>
+    <p:sldId id="263" r:id="rId7"/>
+    <p:sldId id="261" r:id="rId8"/>
+    <p:sldId id="262" r:id="rId9"/>
+    <p:sldId id="264" r:id="rId10"/>
   </p:sldIdLst>
   <p:sldSz cx="12192000" cy="6858000"/>
   <p:notesSz cx="6858000" cy="9144000"/>
@@ -104,6 +112,11 @@
       </a:defRPr>
     </a:lvl9pPr>
   </p:defaultTextStyle>
+  <p:extLst>
+    <p:ext uri="{EFAFB233-063F-42B5-8137-9DF3F51BA10A}">
+      <p15:sldGuideLst xmlns:p15="http://schemas.microsoft.com/office/powerpoint/2012/main"/>
+    </p:ext>
+  </p:extLst>
 </p:presentation>
 </file>
 
@@ -256,7 +269,7 @@
           <a:p>
             <a:fld id="{4D88A768-C1C7-42F5-96C1-97A1B54A15D3}" type="datetimeFigureOut">
               <a:rPr lang="en-ID" smtClean="0"/>
-              <a:t>22/07/2022</a:t>
+              <a:t>23/07/2022</a:t>
             </a:fld>
             <a:endParaRPr lang="en-ID"/>
           </a:p>
@@ -456,7 +469,7 @@
           <a:p>
             <a:fld id="{4D88A768-C1C7-42F5-96C1-97A1B54A15D3}" type="datetimeFigureOut">
               <a:rPr lang="en-ID" smtClean="0"/>
-              <a:t>22/07/2022</a:t>
+              <a:t>23/07/2022</a:t>
             </a:fld>
             <a:endParaRPr lang="en-ID"/>
           </a:p>
@@ -666,7 +679,7 @@
           <a:p>
             <a:fld id="{4D88A768-C1C7-42F5-96C1-97A1B54A15D3}" type="datetimeFigureOut">
               <a:rPr lang="en-ID" smtClean="0"/>
-              <a:t>22/07/2022</a:t>
+              <a:t>23/07/2022</a:t>
             </a:fld>
             <a:endParaRPr lang="en-ID"/>
           </a:p>
@@ -866,7 +879,7 @@
           <a:p>
             <a:fld id="{4D88A768-C1C7-42F5-96C1-97A1B54A15D3}" type="datetimeFigureOut">
               <a:rPr lang="en-ID" smtClean="0"/>
-              <a:t>22/07/2022</a:t>
+              <a:t>23/07/2022</a:t>
             </a:fld>
             <a:endParaRPr lang="en-ID"/>
           </a:p>
@@ -1142,7 +1155,7 @@
           <a:p>
             <a:fld id="{4D88A768-C1C7-42F5-96C1-97A1B54A15D3}" type="datetimeFigureOut">
               <a:rPr lang="en-ID" smtClean="0"/>
-              <a:t>22/07/2022</a:t>
+              <a:t>23/07/2022</a:t>
             </a:fld>
             <a:endParaRPr lang="en-ID"/>
           </a:p>
@@ -1410,7 +1423,7 @@
           <a:p>
             <a:fld id="{4D88A768-C1C7-42F5-96C1-97A1B54A15D3}" type="datetimeFigureOut">
               <a:rPr lang="en-ID" smtClean="0"/>
-              <a:t>22/07/2022</a:t>
+              <a:t>23/07/2022</a:t>
             </a:fld>
             <a:endParaRPr lang="en-ID"/>
           </a:p>
@@ -1825,7 +1838,7 @@
           <a:p>
             <a:fld id="{4D88A768-C1C7-42F5-96C1-97A1B54A15D3}" type="datetimeFigureOut">
               <a:rPr lang="en-ID" smtClean="0"/>
-              <a:t>22/07/2022</a:t>
+              <a:t>23/07/2022</a:t>
             </a:fld>
             <a:endParaRPr lang="en-ID"/>
           </a:p>
@@ -1967,7 +1980,7 @@
           <a:p>
             <a:fld id="{4D88A768-C1C7-42F5-96C1-97A1B54A15D3}" type="datetimeFigureOut">
               <a:rPr lang="en-ID" smtClean="0"/>
-              <a:t>22/07/2022</a:t>
+              <a:t>23/07/2022</a:t>
             </a:fld>
             <a:endParaRPr lang="en-ID"/>
           </a:p>
@@ -2080,7 +2093,7 @@
           <a:p>
             <a:fld id="{4D88A768-C1C7-42F5-96C1-97A1B54A15D3}" type="datetimeFigureOut">
               <a:rPr lang="en-ID" smtClean="0"/>
-              <a:t>22/07/2022</a:t>
+              <a:t>23/07/2022</a:t>
             </a:fld>
             <a:endParaRPr lang="en-ID"/>
           </a:p>
@@ -2393,7 +2406,7 @@
           <a:p>
             <a:fld id="{4D88A768-C1C7-42F5-96C1-97A1B54A15D3}" type="datetimeFigureOut">
               <a:rPr lang="en-ID" smtClean="0"/>
-              <a:t>22/07/2022</a:t>
+              <a:t>23/07/2022</a:t>
             </a:fld>
             <a:endParaRPr lang="en-ID"/>
           </a:p>
@@ -2682,7 +2695,7 @@
           <a:p>
             <a:fld id="{4D88A768-C1C7-42F5-96C1-97A1B54A15D3}" type="datetimeFigureOut">
               <a:rPr lang="en-ID" smtClean="0"/>
-              <a:t>22/07/2022</a:t>
+              <a:t>23/07/2022</a:t>
             </a:fld>
             <a:endParaRPr lang="en-ID"/>
           </a:p>
@@ -2925,7 +2938,7 @@
           <a:p>
             <a:fld id="{4D88A768-C1C7-42F5-96C1-97A1B54A15D3}" type="datetimeFigureOut">
               <a:rPr lang="en-ID" smtClean="0"/>
-              <a:t>22/07/2022</a:t>
+              <a:t>23/07/2022</a:t>
             </a:fld>
             <a:endParaRPr lang="en-ID"/>
           </a:p>
@@ -3450,6 +3463,714 @@
 </p:sld>
 </file>
 
+<file path=ppt/slides/slide2.xml><?xml version="1.0" encoding="utf-8"?>
+<p:sld xmlns:a="http://schemas.openxmlformats.org/drawingml/2006/main" xmlns:r="http://schemas.openxmlformats.org/officeDocument/2006/relationships" xmlns:p="http://schemas.openxmlformats.org/presentationml/2006/main">
+  <p:cSld>
+    <p:spTree>
+      <p:nvGrpSpPr>
+        <p:cNvPr id="1" name=""/>
+        <p:cNvGrpSpPr/>
+        <p:nvPr/>
+      </p:nvGrpSpPr>
+      <p:grpSpPr>
+        <a:xfrm>
+          <a:off x="0" y="0"/>
+          <a:ext cx="0" cy="0"/>
+          <a:chOff x="0" y="0"/>
+          <a:chExt cx="0" cy="0"/>
+        </a:xfrm>
+      </p:grpSpPr>
+      <p:sp>
+        <p:nvSpPr>
+          <p:cNvPr id="2" name="Title 1">
+            <a:extLst>
+              <a:ext uri="{FF2B5EF4-FFF2-40B4-BE49-F238E27FC236}">
+                <a16:creationId xmlns:a16="http://schemas.microsoft.com/office/drawing/2014/main" id="{8FDEAC6A-BDBD-4FEF-8892-52E798D3F1FB}"/>
+              </a:ext>
+            </a:extLst>
+          </p:cNvPr>
+          <p:cNvSpPr>
+            <a:spLocks noGrp="1"/>
+          </p:cNvSpPr>
+          <p:nvPr>
+            <p:ph type="title"/>
+          </p:nvPr>
+        </p:nvSpPr>
+        <p:spPr/>
+        <p:txBody>
+          <a:bodyPr/>
+          <a:lstStyle/>
+          <a:p>
+            <a:r>
+              <a:rPr lang="en-US" dirty="0" err="1"/>
+              <a:t>Latar</a:t>
+            </a:r>
+            <a:r>
+              <a:rPr lang="en-US" dirty="0"/>
+              <a:t> </a:t>
+            </a:r>
+            <a:r>
+              <a:rPr lang="en-US" dirty="0" err="1"/>
+              <a:t>Belakang</a:t>
+            </a:r>
+            <a:endParaRPr lang="en-ID" dirty="0"/>
+          </a:p>
+        </p:txBody>
+      </p:sp>
+      <p:sp>
+        <p:nvSpPr>
+          <p:cNvPr id="3" name="Content Placeholder 2">
+            <a:extLst>
+              <a:ext uri="{FF2B5EF4-FFF2-40B4-BE49-F238E27FC236}">
+                <a16:creationId xmlns:a16="http://schemas.microsoft.com/office/drawing/2014/main" id="{8353A173-0496-4467-AECB-E8A1407D7926}"/>
+              </a:ext>
+            </a:extLst>
+          </p:cNvPr>
+          <p:cNvSpPr>
+            <a:spLocks noGrp="1"/>
+          </p:cNvSpPr>
+          <p:nvPr>
+            <p:ph idx="1"/>
+          </p:nvPr>
+        </p:nvSpPr>
+        <p:spPr/>
+        <p:txBody>
+          <a:bodyPr/>
+          <a:lstStyle/>
+          <a:p>
+            <a:endParaRPr lang="en-ID"/>
+          </a:p>
+        </p:txBody>
+      </p:sp>
+    </p:spTree>
+    <p:extLst>
+      <p:ext uri="{BB962C8B-B14F-4D97-AF65-F5344CB8AC3E}">
+        <p14:creationId xmlns:p14="http://schemas.microsoft.com/office/powerpoint/2010/main" val="2277247808"/>
+      </p:ext>
+    </p:extLst>
+  </p:cSld>
+  <p:clrMapOvr>
+    <a:masterClrMapping/>
+  </p:clrMapOvr>
+</p:sld>
+</file>
+
+<file path=ppt/slides/slide3.xml><?xml version="1.0" encoding="utf-8"?>
+<p:sld xmlns:a="http://schemas.openxmlformats.org/drawingml/2006/main" xmlns:r="http://schemas.openxmlformats.org/officeDocument/2006/relationships" xmlns:p="http://schemas.openxmlformats.org/presentationml/2006/main">
+  <p:cSld>
+    <p:spTree>
+      <p:nvGrpSpPr>
+        <p:cNvPr id="1" name=""/>
+        <p:cNvGrpSpPr/>
+        <p:nvPr/>
+      </p:nvGrpSpPr>
+      <p:grpSpPr>
+        <a:xfrm>
+          <a:off x="0" y="0"/>
+          <a:ext cx="0" cy="0"/>
+          <a:chOff x="0" y="0"/>
+          <a:chExt cx="0" cy="0"/>
+        </a:xfrm>
+      </p:grpSpPr>
+      <p:sp>
+        <p:nvSpPr>
+          <p:cNvPr id="2" name="Title 1">
+            <a:extLst>
+              <a:ext uri="{FF2B5EF4-FFF2-40B4-BE49-F238E27FC236}">
+                <a16:creationId xmlns:a16="http://schemas.microsoft.com/office/drawing/2014/main" id="{516C2B14-1015-49CC-A8AC-C108FB6349B6}"/>
+              </a:ext>
+            </a:extLst>
+          </p:cNvPr>
+          <p:cNvSpPr>
+            <a:spLocks noGrp="1"/>
+          </p:cNvSpPr>
+          <p:nvPr>
+            <p:ph type="title"/>
+          </p:nvPr>
+        </p:nvSpPr>
+        <p:spPr/>
+        <p:txBody>
+          <a:bodyPr/>
+          <a:lstStyle/>
+          <a:p>
+            <a:r>
+              <a:rPr lang="en-US" dirty="0"/>
+              <a:t>Solusi</a:t>
+            </a:r>
+            <a:endParaRPr lang="en-ID" dirty="0"/>
+          </a:p>
+        </p:txBody>
+      </p:sp>
+      <p:sp>
+        <p:nvSpPr>
+          <p:cNvPr id="3" name="Content Placeholder 2">
+            <a:extLst>
+              <a:ext uri="{FF2B5EF4-FFF2-40B4-BE49-F238E27FC236}">
+                <a16:creationId xmlns:a16="http://schemas.microsoft.com/office/drawing/2014/main" id="{825844BA-510A-4F5C-A382-29C64CFD63CC}"/>
+              </a:ext>
+            </a:extLst>
+          </p:cNvPr>
+          <p:cNvSpPr>
+            <a:spLocks noGrp="1"/>
+          </p:cNvSpPr>
+          <p:nvPr>
+            <p:ph idx="1"/>
+          </p:nvPr>
+        </p:nvSpPr>
+        <p:spPr/>
+        <p:txBody>
+          <a:bodyPr/>
+          <a:lstStyle/>
+          <a:p>
+            <a:endParaRPr lang="en-ID"/>
+          </a:p>
+        </p:txBody>
+      </p:sp>
+    </p:spTree>
+    <p:extLst>
+      <p:ext uri="{BB962C8B-B14F-4D97-AF65-F5344CB8AC3E}">
+        <p14:creationId xmlns:p14="http://schemas.microsoft.com/office/powerpoint/2010/main" val="3408905064"/>
+      </p:ext>
+    </p:extLst>
+  </p:cSld>
+  <p:clrMapOvr>
+    <a:masterClrMapping/>
+  </p:clrMapOvr>
+</p:sld>
+</file>
+
+<file path=ppt/slides/slide4.xml><?xml version="1.0" encoding="utf-8"?>
+<p:sld xmlns:a="http://schemas.openxmlformats.org/drawingml/2006/main" xmlns:r="http://schemas.openxmlformats.org/officeDocument/2006/relationships" xmlns:p="http://schemas.openxmlformats.org/presentationml/2006/main">
+  <p:cSld>
+    <p:spTree>
+      <p:nvGrpSpPr>
+        <p:cNvPr id="1" name=""/>
+        <p:cNvGrpSpPr/>
+        <p:nvPr/>
+      </p:nvGrpSpPr>
+      <p:grpSpPr>
+        <a:xfrm>
+          <a:off x="0" y="0"/>
+          <a:ext cx="0" cy="0"/>
+          <a:chOff x="0" y="0"/>
+          <a:chExt cx="0" cy="0"/>
+        </a:xfrm>
+      </p:grpSpPr>
+      <p:sp>
+        <p:nvSpPr>
+          <p:cNvPr id="2" name="Title 1">
+            <a:extLst>
+              <a:ext uri="{FF2B5EF4-FFF2-40B4-BE49-F238E27FC236}">
+                <a16:creationId xmlns:a16="http://schemas.microsoft.com/office/drawing/2014/main" id="{C8AD41EA-EC40-4F6D-A15A-0E25E5B6B4AD}"/>
+              </a:ext>
+            </a:extLst>
+          </p:cNvPr>
+          <p:cNvSpPr>
+            <a:spLocks noGrp="1"/>
+          </p:cNvSpPr>
+          <p:nvPr>
+            <p:ph type="title"/>
+          </p:nvPr>
+        </p:nvSpPr>
+        <p:spPr/>
+        <p:txBody>
+          <a:bodyPr/>
+          <a:lstStyle/>
+          <a:p>
+            <a:r>
+              <a:rPr lang="en-US" dirty="0" err="1"/>
+              <a:t>Teknologi</a:t>
+            </a:r>
+            <a:r>
+              <a:rPr lang="en-US" dirty="0"/>
+              <a:t> yang </a:t>
+            </a:r>
+            <a:r>
+              <a:rPr lang="en-US" dirty="0" err="1"/>
+              <a:t>digunakan</a:t>
+            </a:r>
+            <a:endParaRPr lang="en-ID" dirty="0"/>
+          </a:p>
+        </p:txBody>
+      </p:sp>
+      <p:sp>
+        <p:nvSpPr>
+          <p:cNvPr id="3" name="Content Placeholder 2">
+            <a:extLst>
+              <a:ext uri="{FF2B5EF4-FFF2-40B4-BE49-F238E27FC236}">
+                <a16:creationId xmlns:a16="http://schemas.microsoft.com/office/drawing/2014/main" id="{B9668439-9498-4FDB-A711-7B3DA4D8D849}"/>
+              </a:ext>
+            </a:extLst>
+          </p:cNvPr>
+          <p:cNvSpPr>
+            <a:spLocks noGrp="1"/>
+          </p:cNvSpPr>
+          <p:nvPr>
+            <p:ph idx="1"/>
+          </p:nvPr>
+        </p:nvSpPr>
+        <p:spPr/>
+        <p:txBody>
+          <a:bodyPr/>
+          <a:lstStyle/>
+          <a:p>
+            <a:endParaRPr lang="en-ID"/>
+          </a:p>
+        </p:txBody>
+      </p:sp>
+    </p:spTree>
+    <p:extLst>
+      <p:ext uri="{BB962C8B-B14F-4D97-AF65-F5344CB8AC3E}">
+        <p14:creationId xmlns:p14="http://schemas.microsoft.com/office/powerpoint/2010/main" val="2506349675"/>
+      </p:ext>
+    </p:extLst>
+  </p:cSld>
+  <p:clrMapOvr>
+    <a:masterClrMapping/>
+  </p:clrMapOvr>
+</p:sld>
+</file>
+
+<file path=ppt/slides/slide5.xml><?xml version="1.0" encoding="utf-8"?>
+<p:sld xmlns:a="http://schemas.openxmlformats.org/drawingml/2006/main" xmlns:r="http://schemas.openxmlformats.org/officeDocument/2006/relationships" xmlns:p="http://schemas.openxmlformats.org/presentationml/2006/main">
+  <p:cSld>
+    <p:spTree>
+      <p:nvGrpSpPr>
+        <p:cNvPr id="1" name=""/>
+        <p:cNvGrpSpPr/>
+        <p:nvPr/>
+      </p:nvGrpSpPr>
+      <p:grpSpPr>
+        <a:xfrm>
+          <a:off x="0" y="0"/>
+          <a:ext cx="0" cy="0"/>
+          <a:chOff x="0" y="0"/>
+          <a:chExt cx="0" cy="0"/>
+        </a:xfrm>
+      </p:grpSpPr>
+      <p:sp>
+        <p:nvSpPr>
+          <p:cNvPr id="2" name="Title 1">
+            <a:extLst>
+              <a:ext uri="{FF2B5EF4-FFF2-40B4-BE49-F238E27FC236}">
+                <a16:creationId xmlns:a16="http://schemas.microsoft.com/office/drawing/2014/main" id="{7E3C4453-82CE-4F94-88EE-547CC1C439B7}"/>
+              </a:ext>
+            </a:extLst>
+          </p:cNvPr>
+          <p:cNvSpPr>
+            <a:spLocks noGrp="1"/>
+          </p:cNvSpPr>
+          <p:nvPr>
+            <p:ph type="title"/>
+          </p:nvPr>
+        </p:nvSpPr>
+        <p:spPr/>
+        <p:txBody>
+          <a:bodyPr/>
+          <a:lstStyle/>
+          <a:p>
+            <a:r>
+              <a:rPr lang="en-US" dirty="0" err="1"/>
+              <a:t>Arsitektur</a:t>
+            </a:r>
+            <a:r>
+              <a:rPr lang="en-US" dirty="0"/>
+              <a:t> Robot</a:t>
+            </a:r>
+            <a:endParaRPr lang="en-ID" dirty="0"/>
+          </a:p>
+        </p:txBody>
+      </p:sp>
+      <p:sp>
+        <p:nvSpPr>
+          <p:cNvPr id="3" name="Content Placeholder 2">
+            <a:extLst>
+              <a:ext uri="{FF2B5EF4-FFF2-40B4-BE49-F238E27FC236}">
+                <a16:creationId xmlns:a16="http://schemas.microsoft.com/office/drawing/2014/main" id="{60A2AA57-4DB4-42FA-AACE-28D5F5494FA3}"/>
+              </a:ext>
+            </a:extLst>
+          </p:cNvPr>
+          <p:cNvSpPr>
+            <a:spLocks noGrp="1"/>
+          </p:cNvSpPr>
+          <p:nvPr>
+            <p:ph idx="1"/>
+          </p:nvPr>
+        </p:nvSpPr>
+        <p:spPr/>
+        <p:txBody>
+          <a:bodyPr/>
+          <a:lstStyle/>
+          <a:p>
+            <a:endParaRPr lang="en-ID"/>
+          </a:p>
+        </p:txBody>
+      </p:sp>
+    </p:spTree>
+    <p:extLst>
+      <p:ext uri="{BB962C8B-B14F-4D97-AF65-F5344CB8AC3E}">
+        <p14:creationId xmlns:p14="http://schemas.microsoft.com/office/powerpoint/2010/main" val="1317789492"/>
+      </p:ext>
+    </p:extLst>
+  </p:cSld>
+  <p:clrMapOvr>
+    <a:masterClrMapping/>
+  </p:clrMapOvr>
+</p:sld>
+</file>
+
+<file path=ppt/slides/slide6.xml><?xml version="1.0" encoding="utf-8"?>
+<p:sld xmlns:a="http://schemas.openxmlformats.org/drawingml/2006/main" xmlns:r="http://schemas.openxmlformats.org/officeDocument/2006/relationships" xmlns:p="http://schemas.openxmlformats.org/presentationml/2006/main">
+  <p:cSld>
+    <p:spTree>
+      <p:nvGrpSpPr>
+        <p:cNvPr id="1" name=""/>
+        <p:cNvGrpSpPr/>
+        <p:nvPr/>
+      </p:nvGrpSpPr>
+      <p:grpSpPr>
+        <a:xfrm>
+          <a:off x="0" y="0"/>
+          <a:ext cx="0" cy="0"/>
+          <a:chOff x="0" y="0"/>
+          <a:chExt cx="0" cy="0"/>
+        </a:xfrm>
+      </p:grpSpPr>
+      <p:sp>
+        <p:nvSpPr>
+          <p:cNvPr id="2" name="Title 1">
+            <a:extLst>
+              <a:ext uri="{FF2B5EF4-FFF2-40B4-BE49-F238E27FC236}">
+                <a16:creationId xmlns:a16="http://schemas.microsoft.com/office/drawing/2014/main" id="{7E3C4453-82CE-4F94-88EE-547CC1C439B7}"/>
+              </a:ext>
+            </a:extLst>
+          </p:cNvPr>
+          <p:cNvSpPr>
+            <a:spLocks noGrp="1"/>
+          </p:cNvSpPr>
+          <p:nvPr>
+            <p:ph type="title"/>
+          </p:nvPr>
+        </p:nvSpPr>
+        <p:spPr/>
+        <p:txBody>
+          <a:bodyPr/>
+          <a:lstStyle/>
+          <a:p>
+            <a:r>
+              <a:rPr lang="en-US" dirty="0"/>
+              <a:t>Model Canvas</a:t>
+            </a:r>
+            <a:endParaRPr lang="en-ID" dirty="0"/>
+          </a:p>
+        </p:txBody>
+      </p:sp>
+      <p:sp>
+        <p:nvSpPr>
+          <p:cNvPr id="3" name="Content Placeholder 2">
+            <a:extLst>
+              <a:ext uri="{FF2B5EF4-FFF2-40B4-BE49-F238E27FC236}">
+                <a16:creationId xmlns:a16="http://schemas.microsoft.com/office/drawing/2014/main" id="{60A2AA57-4DB4-42FA-AACE-28D5F5494FA3}"/>
+              </a:ext>
+            </a:extLst>
+          </p:cNvPr>
+          <p:cNvSpPr>
+            <a:spLocks noGrp="1"/>
+          </p:cNvSpPr>
+          <p:nvPr>
+            <p:ph idx="1"/>
+          </p:nvPr>
+        </p:nvSpPr>
+        <p:spPr/>
+        <p:txBody>
+          <a:bodyPr/>
+          <a:lstStyle/>
+          <a:p>
+            <a:endParaRPr lang="en-ID"/>
+          </a:p>
+        </p:txBody>
+      </p:sp>
+    </p:spTree>
+    <p:extLst>
+      <p:ext uri="{BB962C8B-B14F-4D97-AF65-F5344CB8AC3E}">
+        <p14:creationId xmlns:p14="http://schemas.microsoft.com/office/powerpoint/2010/main" val="2410119957"/>
+      </p:ext>
+    </p:extLst>
+  </p:cSld>
+  <p:clrMapOvr>
+    <a:masterClrMapping/>
+  </p:clrMapOvr>
+</p:sld>
+</file>
+
+<file path=ppt/slides/slide7.xml><?xml version="1.0" encoding="utf-8"?>
+<p:sld xmlns:a="http://schemas.openxmlformats.org/drawingml/2006/main" xmlns:r="http://schemas.openxmlformats.org/officeDocument/2006/relationships" xmlns:p="http://schemas.openxmlformats.org/presentationml/2006/main">
+  <p:cSld>
+    <p:spTree>
+      <p:nvGrpSpPr>
+        <p:cNvPr id="1" name=""/>
+        <p:cNvGrpSpPr/>
+        <p:nvPr/>
+      </p:nvGrpSpPr>
+      <p:grpSpPr>
+        <a:xfrm>
+          <a:off x="0" y="0"/>
+          <a:ext cx="0" cy="0"/>
+          <a:chOff x="0" y="0"/>
+          <a:chExt cx="0" cy="0"/>
+        </a:xfrm>
+      </p:grpSpPr>
+      <p:sp>
+        <p:nvSpPr>
+          <p:cNvPr id="2" name="Title 1">
+            <a:extLst>
+              <a:ext uri="{FF2B5EF4-FFF2-40B4-BE49-F238E27FC236}">
+                <a16:creationId xmlns:a16="http://schemas.microsoft.com/office/drawing/2014/main" id="{8CC135D5-82FC-4CED-A55F-2B9C85496707}"/>
+              </a:ext>
+            </a:extLst>
+          </p:cNvPr>
+          <p:cNvSpPr>
+            <a:spLocks noGrp="1"/>
+          </p:cNvSpPr>
+          <p:nvPr>
+            <p:ph type="title"/>
+          </p:nvPr>
+        </p:nvSpPr>
+        <p:spPr/>
+        <p:txBody>
+          <a:bodyPr/>
+          <a:lstStyle/>
+          <a:p>
+            <a:r>
+              <a:rPr lang="en-US" dirty="0"/>
+              <a:t>Target dan </a:t>
+            </a:r>
+            <a:r>
+              <a:rPr lang="en-US" dirty="0" err="1"/>
+              <a:t>Potensi</a:t>
+            </a:r>
+            <a:r>
+              <a:rPr lang="en-US" dirty="0"/>
+              <a:t> Pasar</a:t>
+            </a:r>
+            <a:endParaRPr lang="en-ID" dirty="0"/>
+          </a:p>
+        </p:txBody>
+      </p:sp>
+      <p:sp>
+        <p:nvSpPr>
+          <p:cNvPr id="3" name="Content Placeholder 2">
+            <a:extLst>
+              <a:ext uri="{FF2B5EF4-FFF2-40B4-BE49-F238E27FC236}">
+                <a16:creationId xmlns:a16="http://schemas.microsoft.com/office/drawing/2014/main" id="{53C60CBF-5255-47BD-8B13-AC27176C1CB9}"/>
+              </a:ext>
+            </a:extLst>
+          </p:cNvPr>
+          <p:cNvSpPr>
+            <a:spLocks noGrp="1"/>
+          </p:cNvSpPr>
+          <p:nvPr>
+            <p:ph idx="1"/>
+          </p:nvPr>
+        </p:nvSpPr>
+        <p:spPr/>
+        <p:txBody>
+          <a:bodyPr/>
+          <a:lstStyle/>
+          <a:p>
+            <a:endParaRPr lang="en-ID"/>
+          </a:p>
+        </p:txBody>
+      </p:sp>
+    </p:spTree>
+    <p:extLst>
+      <p:ext uri="{BB962C8B-B14F-4D97-AF65-F5344CB8AC3E}">
+        <p14:creationId xmlns:p14="http://schemas.microsoft.com/office/powerpoint/2010/main" val="3543259719"/>
+      </p:ext>
+    </p:extLst>
+  </p:cSld>
+  <p:clrMapOvr>
+    <a:masterClrMapping/>
+  </p:clrMapOvr>
+</p:sld>
+</file>
+
+<file path=ppt/slides/slide8.xml><?xml version="1.0" encoding="utf-8"?>
+<p:sld xmlns:a="http://schemas.openxmlformats.org/drawingml/2006/main" xmlns:r="http://schemas.openxmlformats.org/officeDocument/2006/relationships" xmlns:p="http://schemas.openxmlformats.org/presentationml/2006/main">
+  <p:cSld>
+    <p:spTree>
+      <p:nvGrpSpPr>
+        <p:cNvPr id="1" name=""/>
+        <p:cNvGrpSpPr/>
+        <p:nvPr/>
+      </p:nvGrpSpPr>
+      <p:grpSpPr>
+        <a:xfrm>
+          <a:off x="0" y="0"/>
+          <a:ext cx="0" cy="0"/>
+          <a:chOff x="0" y="0"/>
+          <a:chExt cx="0" cy="0"/>
+        </a:xfrm>
+      </p:grpSpPr>
+      <p:sp>
+        <p:nvSpPr>
+          <p:cNvPr id="2" name="Title 1">
+            <a:extLst>
+              <a:ext uri="{FF2B5EF4-FFF2-40B4-BE49-F238E27FC236}">
+                <a16:creationId xmlns:a16="http://schemas.microsoft.com/office/drawing/2014/main" id="{8E1BEDDB-C1B0-4212-A721-D5473B5C3F72}"/>
+              </a:ext>
+            </a:extLst>
+          </p:cNvPr>
+          <p:cNvSpPr>
+            <a:spLocks noGrp="1"/>
+          </p:cNvSpPr>
+          <p:nvPr>
+            <p:ph type="title"/>
+          </p:nvPr>
+        </p:nvSpPr>
+        <p:spPr/>
+        <p:txBody>
+          <a:bodyPr/>
+          <a:lstStyle/>
+          <a:p>
+            <a:r>
+              <a:rPr lang="en-US" dirty="0" err="1"/>
+              <a:t>Potensi</a:t>
+            </a:r>
+            <a:r>
+              <a:rPr lang="en-US" dirty="0"/>
+              <a:t> </a:t>
+            </a:r>
+            <a:r>
+              <a:rPr lang="en-US" dirty="0" err="1"/>
+              <a:t>Pengembangan</a:t>
+            </a:r>
+            <a:endParaRPr lang="en-ID" dirty="0"/>
+          </a:p>
+        </p:txBody>
+      </p:sp>
+      <p:sp>
+        <p:nvSpPr>
+          <p:cNvPr id="3" name="Content Placeholder 2">
+            <a:extLst>
+              <a:ext uri="{FF2B5EF4-FFF2-40B4-BE49-F238E27FC236}">
+                <a16:creationId xmlns:a16="http://schemas.microsoft.com/office/drawing/2014/main" id="{AD489053-68E2-4496-B2C3-12D5812AF0E3}"/>
+              </a:ext>
+            </a:extLst>
+          </p:cNvPr>
+          <p:cNvSpPr>
+            <a:spLocks noGrp="1"/>
+          </p:cNvSpPr>
+          <p:nvPr>
+            <p:ph idx="1"/>
+          </p:nvPr>
+        </p:nvSpPr>
+        <p:spPr/>
+        <p:txBody>
+          <a:bodyPr/>
+          <a:lstStyle/>
+          <a:p>
+            <a:endParaRPr lang="en-ID"/>
+          </a:p>
+        </p:txBody>
+      </p:sp>
+    </p:spTree>
+    <p:extLst>
+      <p:ext uri="{BB962C8B-B14F-4D97-AF65-F5344CB8AC3E}">
+        <p14:creationId xmlns:p14="http://schemas.microsoft.com/office/powerpoint/2010/main" val="1378702523"/>
+      </p:ext>
+    </p:extLst>
+  </p:cSld>
+  <p:clrMapOvr>
+    <a:masterClrMapping/>
+  </p:clrMapOvr>
+</p:sld>
+</file>
+
+<file path=ppt/slides/slide9.xml><?xml version="1.0" encoding="utf-8"?>
+<p:sld xmlns:a="http://schemas.openxmlformats.org/drawingml/2006/main" xmlns:r="http://schemas.openxmlformats.org/officeDocument/2006/relationships" xmlns:p="http://schemas.openxmlformats.org/presentationml/2006/main">
+  <p:cSld>
+    <p:spTree>
+      <p:nvGrpSpPr>
+        <p:cNvPr id="1" name=""/>
+        <p:cNvGrpSpPr/>
+        <p:nvPr/>
+      </p:nvGrpSpPr>
+      <p:grpSpPr>
+        <a:xfrm>
+          <a:off x="0" y="0"/>
+          <a:ext cx="0" cy="0"/>
+          <a:chOff x="0" y="0"/>
+          <a:chExt cx="0" cy="0"/>
+        </a:xfrm>
+      </p:grpSpPr>
+      <p:sp>
+        <p:nvSpPr>
+          <p:cNvPr id="2" name="Title 1">
+            <a:extLst>
+              <a:ext uri="{FF2B5EF4-FFF2-40B4-BE49-F238E27FC236}">
+                <a16:creationId xmlns:a16="http://schemas.microsoft.com/office/drawing/2014/main" id="{FF277E53-7FED-41E1-959F-004FE9B4344A}"/>
+              </a:ext>
+            </a:extLst>
+          </p:cNvPr>
+          <p:cNvSpPr>
+            <a:spLocks noGrp="1"/>
+          </p:cNvSpPr>
+          <p:nvPr>
+            <p:ph type="title"/>
+          </p:nvPr>
+        </p:nvSpPr>
+        <p:spPr/>
+        <p:txBody>
+          <a:bodyPr/>
+          <a:lstStyle/>
+          <a:p>
+            <a:r>
+              <a:rPr lang="en-US" dirty="0"/>
+              <a:t>Team</a:t>
+            </a:r>
+            <a:endParaRPr lang="en-ID" dirty="0"/>
+          </a:p>
+        </p:txBody>
+      </p:sp>
+      <p:sp>
+        <p:nvSpPr>
+          <p:cNvPr id="3" name="Content Placeholder 2">
+            <a:extLst>
+              <a:ext uri="{FF2B5EF4-FFF2-40B4-BE49-F238E27FC236}">
+                <a16:creationId xmlns:a16="http://schemas.microsoft.com/office/drawing/2014/main" id="{FA268D2F-0F6A-4A70-A331-EE17695C4BE9}"/>
+              </a:ext>
+            </a:extLst>
+          </p:cNvPr>
+          <p:cNvSpPr>
+            <a:spLocks noGrp="1"/>
+          </p:cNvSpPr>
+          <p:nvPr>
+            <p:ph idx="1"/>
+          </p:nvPr>
+        </p:nvSpPr>
+        <p:spPr/>
+        <p:txBody>
+          <a:bodyPr/>
+          <a:lstStyle/>
+          <a:p>
+            <a:endParaRPr lang="en-ID"/>
+          </a:p>
+        </p:txBody>
+      </p:sp>
+    </p:spTree>
+    <p:extLst>
+      <p:ext uri="{BB962C8B-B14F-4D97-AF65-F5344CB8AC3E}">
+        <p14:creationId xmlns:p14="http://schemas.microsoft.com/office/powerpoint/2010/main" val="681480205"/>
+      </p:ext>
+    </p:extLst>
+  </p:cSld>
+  <p:clrMapOvr>
+    <a:masterClrMapping/>
+  </p:clrMapOvr>
+</p:sld>
+</file>
+
 <file path=ppt/theme/theme1.xml><?xml version="1.0" encoding="utf-8"?>
 <a:theme xmlns:a="http://schemas.openxmlformats.org/drawingml/2006/main" name="Office Theme">
   <a:themeElements>

</xml_diff>